<commit_message>
Update sequence according to tutor's comment
</commit_message>
<xml_diff>
--- a/docs/diagrams/AdddietSequenceDiagram.pptx
+++ b/docs/diagrams/AdddietSequenceDiagram.pptx
@@ -208,7 +208,7 @@
           <a:p>
             <a:fld id="{F5CC4B3F-88C1-4FFA-B1B6-F41C21DC6924}" type="datetimeFigureOut">
               <a:rPr lang="en-US" smtClean="0"/>
-              <a:t>10/16/2018</a:t>
+              <a:t>11/10/2018</a:t>
             </a:fld>
             <a:endParaRPr lang="en-US"/>
           </a:p>
@@ -738,7 +738,7 @@
           <a:p>
             <a:fld id="{78C97017-6FC3-485B-9764-EAC9E56C1D49}" type="datetimeFigureOut">
               <a:rPr lang="en-US" smtClean="0"/>
-              <a:t>10/16/2018</a:t>
+              <a:t>11/10/2018</a:t>
             </a:fld>
             <a:endParaRPr lang="en-US"/>
           </a:p>
@@ -906,7 +906,7 @@
           <a:p>
             <a:fld id="{78C97017-6FC3-485B-9764-EAC9E56C1D49}" type="datetimeFigureOut">
               <a:rPr lang="en-US" smtClean="0"/>
-              <a:t>10/16/2018</a:t>
+              <a:t>11/10/2018</a:t>
             </a:fld>
             <a:endParaRPr lang="en-US"/>
           </a:p>
@@ -1084,7 +1084,7 @@
           <a:p>
             <a:fld id="{78C97017-6FC3-485B-9764-EAC9E56C1D49}" type="datetimeFigureOut">
               <a:rPr lang="en-US" smtClean="0"/>
-              <a:t>10/16/2018</a:t>
+              <a:t>11/10/2018</a:t>
             </a:fld>
             <a:endParaRPr lang="en-US"/>
           </a:p>
@@ -1252,7 +1252,7 @@
           <a:p>
             <a:fld id="{78C97017-6FC3-485B-9764-EAC9E56C1D49}" type="datetimeFigureOut">
               <a:rPr lang="en-US" smtClean="0"/>
-              <a:t>10/16/2018</a:t>
+              <a:t>11/10/2018</a:t>
             </a:fld>
             <a:endParaRPr lang="en-US"/>
           </a:p>
@@ -1497,7 +1497,7 @@
           <a:p>
             <a:fld id="{78C97017-6FC3-485B-9764-EAC9E56C1D49}" type="datetimeFigureOut">
               <a:rPr lang="en-US" smtClean="0"/>
-              <a:t>10/16/2018</a:t>
+              <a:t>11/10/2018</a:t>
             </a:fld>
             <a:endParaRPr lang="en-US"/>
           </a:p>
@@ -1782,7 +1782,7 @@
           <a:p>
             <a:fld id="{78C97017-6FC3-485B-9764-EAC9E56C1D49}" type="datetimeFigureOut">
               <a:rPr lang="en-US" smtClean="0"/>
-              <a:t>10/16/2018</a:t>
+              <a:t>11/10/2018</a:t>
             </a:fld>
             <a:endParaRPr lang="en-US"/>
           </a:p>
@@ -2201,7 +2201,7 @@
           <a:p>
             <a:fld id="{78C97017-6FC3-485B-9764-EAC9E56C1D49}" type="datetimeFigureOut">
               <a:rPr lang="en-US" smtClean="0"/>
-              <a:t>10/16/2018</a:t>
+              <a:t>11/10/2018</a:t>
             </a:fld>
             <a:endParaRPr lang="en-US"/>
           </a:p>
@@ -2318,7 +2318,7 @@
           <a:p>
             <a:fld id="{78C97017-6FC3-485B-9764-EAC9E56C1D49}" type="datetimeFigureOut">
               <a:rPr lang="en-US" smtClean="0"/>
-              <a:t>10/16/2018</a:t>
+              <a:t>11/10/2018</a:t>
             </a:fld>
             <a:endParaRPr lang="en-US"/>
           </a:p>
@@ -2413,7 +2413,7 @@
           <a:p>
             <a:fld id="{78C97017-6FC3-485B-9764-EAC9E56C1D49}" type="datetimeFigureOut">
               <a:rPr lang="en-US" smtClean="0"/>
-              <a:t>10/16/2018</a:t>
+              <a:t>11/10/2018</a:t>
             </a:fld>
             <a:endParaRPr lang="en-US"/>
           </a:p>
@@ -2688,7 +2688,7 @@
           <a:p>
             <a:fld id="{78C97017-6FC3-485B-9764-EAC9E56C1D49}" type="datetimeFigureOut">
               <a:rPr lang="en-US" smtClean="0"/>
-              <a:t>10/16/2018</a:t>
+              <a:t>11/10/2018</a:t>
             </a:fld>
             <a:endParaRPr lang="en-US"/>
           </a:p>
@@ -2940,7 +2940,7 @@
           <a:p>
             <a:fld id="{78C97017-6FC3-485B-9764-EAC9E56C1D49}" type="datetimeFigureOut">
               <a:rPr lang="en-US" smtClean="0"/>
-              <a:t>10/16/2018</a:t>
+              <a:t>11/10/2018</a:t>
             </a:fld>
             <a:endParaRPr lang="en-US"/>
           </a:p>
@@ -3151,7 +3151,7 @@
           <a:p>
             <a:fld id="{78C97017-6FC3-485B-9764-EAC9E56C1D49}" type="datetimeFigureOut">
               <a:rPr lang="en-US" smtClean="0"/>
-              <a:t>10/16/2018</a:t>
+              <a:t>11/10/2018</a:t>
             </a:fld>
             <a:endParaRPr lang="en-US"/>
           </a:p>
@@ -3595,7 +3595,7 @@
         </p:nvSpPr>
         <p:spPr>
           <a:xfrm>
-            <a:off x="47796" y="163017"/>
+            <a:off x="47796" y="135025"/>
             <a:ext cx="7782903" cy="5746986"/>
           </a:xfrm>
           <a:prstGeom prst="roundRect">
@@ -4008,8 +4008,8 @@
         </p:nvSpPr>
         <p:spPr>
           <a:xfrm>
-            <a:off x="5456801" y="1595828"/>
-            <a:ext cx="162711" cy="1080759"/>
+            <a:off x="5456801" y="1948368"/>
+            <a:ext cx="180691" cy="728219"/>
           </a:xfrm>
           <a:prstGeom prst="rect">
             <a:avLst/>
@@ -4174,7 +4174,7 @@
         </p:nvCxnSpPr>
         <p:spPr>
           <a:xfrm>
-            <a:off x="4113158" y="1847956"/>
+            <a:off x="4105445" y="1958265"/>
             <a:ext cx="1370490" cy="1"/>
           </a:xfrm>
           <a:prstGeom prst="straightConnector1">
@@ -4972,9 +4972,9 @@
           <p:nvPr/>
         </p:nvCxnSpPr>
         <p:spPr>
-          <a:xfrm>
-            <a:off x="1708245" y="1363918"/>
-            <a:ext cx="2256705" cy="1"/>
+          <a:xfrm flipV="1">
+            <a:off x="1592902" y="1368489"/>
+            <a:ext cx="2393107" cy="5833"/>
           </a:xfrm>
           <a:prstGeom prst="straightConnector1">
             <a:avLst/>
@@ -5274,8 +5274,8 @@
         </p:nvSpPr>
         <p:spPr>
           <a:xfrm>
-            <a:off x="4369555" y="1619356"/>
-            <a:ext cx="933080" cy="369332"/>
+            <a:off x="4376452" y="1728835"/>
+            <a:ext cx="933080" cy="169277"/>
           </a:xfrm>
           <a:prstGeom prst="rect">
             <a:avLst/>
@@ -5301,7 +5301,7 @@
           <a:p>
             <a:pPr algn="ctr"/>
             <a:r>
-              <a:rPr lang="en-US" sz="1200" dirty="0"/>
+              <a:rPr lang="en-US" sz="1100" dirty="0"/>
               <a:t>parse(“type/…”)</a:t>
             </a:r>
           </a:p>
@@ -5367,7 +5367,7 @@
         </p:nvCxnSpPr>
         <p:spPr>
           <a:xfrm>
-            <a:off x="5637492" y="1991672"/>
+            <a:off x="5637492" y="2061735"/>
             <a:ext cx="958629" cy="0"/>
           </a:xfrm>
           <a:prstGeom prst="straightConnector1">
@@ -5406,13 +5406,14 @@
           </p:cNvPr>
           <p:cNvCxnSpPr>
             <a:cxnSpLocks/>
+            <a:endCxn id="74" idx="0"/>
           </p:cNvCxnSpPr>
           <p:nvPr/>
         </p:nvCxnSpPr>
         <p:spPr>
-          <a:xfrm>
-            <a:off x="5533902" y="2032200"/>
-            <a:ext cx="0" cy="926908"/>
+          <a:xfrm flipH="1">
+            <a:off x="5565582" y="1615556"/>
+            <a:ext cx="318" cy="1357087"/>
           </a:xfrm>
           <a:prstGeom prst="line">
             <a:avLst/>
@@ -6391,7 +6392,7 @@
         </p:nvSpPr>
         <p:spPr>
           <a:xfrm>
-            <a:off x="5418476" y="2908611"/>
+            <a:off x="5436380" y="2910957"/>
             <a:ext cx="258404" cy="261610"/>
           </a:xfrm>
           <a:prstGeom prst="rect">
@@ -6416,6 +6417,147 @@
           </a:p>
         </p:txBody>
       </p:sp>
+      <p:sp>
+        <p:nvSpPr>
+          <p:cNvPr id="72" name="Rectangle 71">
+            <a:extLst>
+              <a:ext uri="{FF2B5EF4-FFF2-40B4-BE49-F238E27FC236}">
+                <a16:creationId xmlns:a16="http://schemas.microsoft.com/office/drawing/2014/main" id="{C3D4CF51-AC72-465A-B8B3-4B322A4A9219}"/>
+              </a:ext>
+            </a:extLst>
+          </p:cNvPr>
+          <p:cNvSpPr/>
+          <p:nvPr/>
+        </p:nvSpPr>
+        <p:spPr>
+          <a:xfrm>
+            <a:off x="5456801" y="1603561"/>
+            <a:ext cx="180691" cy="120333"/>
+          </a:xfrm>
+          <a:prstGeom prst="rect">
+            <a:avLst/>
+          </a:prstGeom>
+          <a:solidFill>
+            <a:srgbClr val="0070C0"/>
+          </a:solidFill>
+          <a:ln>
+            <a:solidFill>
+              <a:srgbClr val="0070C0"/>
+            </a:solidFill>
+          </a:ln>
+          <a:effectLst/>
+        </p:spPr>
+        <p:style>
+          <a:lnRef idx="1">
+            <a:schemeClr val="accent3"/>
+          </a:lnRef>
+          <a:fillRef idx="2">
+            <a:schemeClr val="accent3"/>
+          </a:fillRef>
+          <a:effectRef idx="1">
+            <a:schemeClr val="accent3"/>
+          </a:effectRef>
+          <a:fontRef idx="minor">
+            <a:schemeClr val="dk1"/>
+          </a:fontRef>
+        </p:style>
+        <p:txBody>
+          <a:bodyPr rtlCol="0" anchor="ctr"/>
+          <a:lstStyle/>
+          <a:p>
+            <a:pPr algn="ctr"/>
+            <a:endParaRPr lang="en-SG" sz="1400"/>
+          </a:p>
+        </p:txBody>
+      </p:sp>
+      <p:cxnSp>
+        <p:nvCxnSpPr>
+          <p:cNvPr id="9" name="Straight Arrow Connector 8">
+            <a:extLst>
+              <a:ext uri="{FF2B5EF4-FFF2-40B4-BE49-F238E27FC236}">
+                <a16:creationId xmlns:a16="http://schemas.microsoft.com/office/drawing/2014/main" id="{D5F4B502-C6A5-4160-B399-74C770EB2702}"/>
+              </a:ext>
+            </a:extLst>
+          </p:cNvPr>
+          <p:cNvCxnSpPr/>
+          <p:nvPr/>
+        </p:nvCxnSpPr>
+        <p:spPr>
+          <a:xfrm flipH="1">
+            <a:off x="7221847" y="3910521"/>
+            <a:ext cx="57052" cy="0"/>
+          </a:xfrm>
+          <a:prstGeom prst="straightConnector1">
+            <a:avLst/>
+          </a:prstGeom>
+          <a:ln>
+            <a:solidFill>
+              <a:schemeClr val="accent1">
+                <a:lumMod val="75000"/>
+              </a:schemeClr>
+            </a:solidFill>
+            <a:tailEnd type="triangle"/>
+          </a:ln>
+        </p:spPr>
+        <p:style>
+          <a:lnRef idx="1">
+            <a:schemeClr val="accent1"/>
+          </a:lnRef>
+          <a:fillRef idx="0">
+            <a:schemeClr val="accent1"/>
+          </a:fillRef>
+          <a:effectRef idx="0">
+            <a:schemeClr val="accent1"/>
+          </a:effectRef>
+          <a:fontRef idx="minor">
+            <a:schemeClr val="tx1"/>
+          </a:fontRef>
+        </p:style>
+      </p:cxnSp>
+      <p:cxnSp>
+        <p:nvCxnSpPr>
+          <p:cNvPr id="11" name="Straight Arrow Connector 10">
+            <a:extLst>
+              <a:ext uri="{FF2B5EF4-FFF2-40B4-BE49-F238E27FC236}">
+                <a16:creationId xmlns:a16="http://schemas.microsoft.com/office/drawing/2014/main" id="{58962282-B2CB-4584-BB30-9014B61069A4}"/>
+              </a:ext>
+            </a:extLst>
+          </p:cNvPr>
+          <p:cNvCxnSpPr/>
+          <p:nvPr/>
+        </p:nvCxnSpPr>
+        <p:spPr>
+          <a:xfrm flipH="1">
+            <a:off x="7207554" y="4635983"/>
+            <a:ext cx="71345" cy="0"/>
+          </a:xfrm>
+          <a:prstGeom prst="straightConnector1">
+            <a:avLst/>
+          </a:prstGeom>
+          <a:ln>
+            <a:solidFill>
+              <a:schemeClr val="accent1">
+                <a:lumMod val="75000"/>
+              </a:schemeClr>
+            </a:solidFill>
+            <a:tailEnd type="triangle"/>
+          </a:ln>
+        </p:spPr>
+        <p:style>
+          <a:lnRef idx="1">
+            <a:schemeClr val="accent1"/>
+          </a:lnRef>
+          <a:fillRef idx="0">
+            <a:schemeClr val="accent1"/>
+          </a:fillRef>
+          <a:effectRef idx="0">
+            <a:schemeClr val="accent1"/>
+          </a:effectRef>
+          <a:fontRef idx="minor">
+            <a:schemeClr val="tx1"/>
+          </a:fontRef>
+        </p:style>
+      </p:cxnSp>
     </p:spTree>
     <p:extLst>
       <p:ext uri="{BB962C8B-B14F-4D97-AF65-F5344CB8AC3E}">

</xml_diff>